<commit_message>
Removed "west" from RDS West
</commit_message>
<xml_diff>
--- a/Intro_to_R/Introduction_to_R_Spring2019/Introduction to R Spring 2019.pptx
+++ b/Intro_to_R/Introduction_to_R_Spring2019/Introduction to R Spring 2019.pptx
@@ -216,7 +216,7 @@
           <a:p>
             <a:fld id="{85B0B4E8-A216-4834-BA1C-6A7DAFED7374}" type="datetimeFigureOut">
               <a:rPr lang="en-US" smtClean="0"/>
-              <a:t>1/23/2019</a:t>
+              <a:t>3/13/2019</a:t>
             </a:fld>
             <a:endParaRPr lang="en-US"/>
           </a:p>
@@ -615,7 +615,7 @@
           <a:p>
             <a:fld id="{C272A757-42F3-4527-9C1E-C8A1E1019F33}" type="datetimeFigureOut">
               <a:rPr lang="en-US" smtClean="0"/>
-              <a:t>1/23/2019</a:t>
+              <a:t>3/13/2019</a:t>
             </a:fld>
             <a:endParaRPr lang="en-US"/>
           </a:p>
@@ -785,7 +785,7 @@
           <a:p>
             <a:fld id="{C272A757-42F3-4527-9C1E-C8A1E1019F33}" type="datetimeFigureOut">
               <a:rPr lang="en-US" smtClean="0"/>
-              <a:t>1/23/2019</a:t>
+              <a:t>3/13/2019</a:t>
             </a:fld>
             <a:endParaRPr lang="en-US"/>
           </a:p>
@@ -965,7 +965,7 @@
           <a:p>
             <a:fld id="{C272A757-42F3-4527-9C1E-C8A1E1019F33}" type="datetimeFigureOut">
               <a:rPr lang="en-US" smtClean="0"/>
-              <a:t>1/23/2019</a:t>
+              <a:t>3/13/2019</a:t>
             </a:fld>
             <a:endParaRPr lang="en-US"/>
           </a:p>
@@ -1436,7 +1436,7 @@
             <a:fld id="{8ACDB3CC-F982-40F9-8DD6-BCC9AFBF44BD}" type="datetime1">
               <a:rPr lang="en-US" smtClean="0"/>
               <a:pPr/>
-              <a:t>1/23/2019</a:t>
+              <a:t>3/13/2019</a:t>
             </a:fld>
             <a:endParaRPr lang="en-US" dirty="0"/>
           </a:p>
@@ -1606,7 +1606,7 @@
           <a:p>
             <a:fld id="{68C2560D-EC28-3B41-86E8-18F1CE0113B4}" type="datetimeFigureOut">
               <a:rPr lang="en-US" smtClean="0"/>
-              <a:t>1/23/2019</a:t>
+              <a:t>3/13/2019</a:t>
             </a:fld>
             <a:endParaRPr lang="en-US"/>
           </a:p>
@@ -1853,7 +1853,7 @@
             <a:fld id="{4A9E7B99-7C3F-4BC3-B7B8-7E1F8C620B24}" type="datetime1">
               <a:rPr lang="en-US" smtClean="0"/>
               <a:pPr/>
-              <a:t>1/23/2019</a:t>
+              <a:t>3/13/2019</a:t>
             </a:fld>
             <a:endParaRPr lang="en-US"/>
           </a:p>
@@ -2147,7 +2147,7 @@
           <a:p>
             <a:fld id="{68C2560D-EC28-3B41-86E8-18F1CE0113B4}" type="datetimeFigureOut">
               <a:rPr lang="en-US" smtClean="0"/>
-              <a:t>1/23/2019</a:t>
+              <a:t>3/13/2019</a:t>
             </a:fld>
             <a:endParaRPr lang="en-US"/>
           </a:p>
@@ -2574,7 +2574,7 @@
           <a:p>
             <a:fld id="{68C2560D-EC28-3B41-86E8-18F1CE0113B4}" type="datetimeFigureOut">
               <a:rPr lang="en-US" smtClean="0"/>
-              <a:t>1/23/2019</a:t>
+              <a:t>3/13/2019</a:t>
             </a:fld>
             <a:endParaRPr lang="en-US"/>
           </a:p>
@@ -2692,7 +2692,7 @@
           <a:p>
             <a:fld id="{68C2560D-EC28-3B41-86E8-18F1CE0113B4}" type="datetimeFigureOut">
               <a:rPr lang="en-US" smtClean="0"/>
-              <a:t>1/23/2019</a:t>
+              <a:t>3/13/2019</a:t>
             </a:fld>
             <a:endParaRPr lang="en-US"/>
           </a:p>
@@ -2787,7 +2787,7 @@
           <a:p>
             <a:fld id="{68C2560D-EC28-3B41-86E8-18F1CE0113B4}" type="datetimeFigureOut">
               <a:rPr lang="en-US" smtClean="0"/>
-              <a:t>1/23/2019</a:t>
+              <a:t>3/13/2019</a:t>
             </a:fld>
             <a:endParaRPr lang="en-US"/>
           </a:p>
@@ -2957,7 +2957,7 @@
           <a:p>
             <a:fld id="{C272A757-42F3-4527-9C1E-C8A1E1019F33}" type="datetimeFigureOut">
               <a:rPr lang="en-US" smtClean="0"/>
-              <a:t>1/23/2019</a:t>
+              <a:t>3/13/2019</a:t>
             </a:fld>
             <a:endParaRPr lang="en-US"/>
           </a:p>
@@ -3234,7 +3234,7 @@
           <a:p>
             <a:fld id="{68C2560D-EC28-3B41-86E8-18F1CE0113B4}" type="datetimeFigureOut">
               <a:rPr lang="en-US" smtClean="0"/>
-              <a:t>1/23/2019</a:t>
+              <a:t>3/13/2019</a:t>
             </a:fld>
             <a:endParaRPr lang="en-US"/>
           </a:p>
@@ -3494,7 +3494,7 @@
           <a:p>
             <a:fld id="{68C2560D-EC28-3B41-86E8-18F1CE0113B4}" type="datetimeFigureOut">
               <a:rPr lang="en-US" smtClean="0"/>
-              <a:t>1/23/2019</a:t>
+              <a:t>3/13/2019</a:t>
             </a:fld>
             <a:endParaRPr lang="en-US"/>
           </a:p>
@@ -3664,7 +3664,7 @@
           <a:p>
             <a:fld id="{68C2560D-EC28-3B41-86E8-18F1CE0113B4}" type="datetimeFigureOut">
               <a:rPr lang="en-US" smtClean="0"/>
-              <a:t>1/23/2019</a:t>
+              <a:t>3/13/2019</a:t>
             </a:fld>
             <a:endParaRPr lang="en-US"/>
           </a:p>
@@ -3844,7 +3844,7 @@
           <a:p>
             <a:fld id="{68C2560D-EC28-3B41-86E8-18F1CE0113B4}" type="datetimeFigureOut">
               <a:rPr lang="en-US" smtClean="0"/>
-              <a:t>1/23/2019</a:t>
+              <a:t>3/13/2019</a:t>
             </a:fld>
             <a:endParaRPr lang="en-US"/>
           </a:p>
@@ -4090,7 +4090,7 @@
           <a:p>
             <a:fld id="{C272A757-42F3-4527-9C1E-C8A1E1019F33}" type="datetimeFigureOut">
               <a:rPr lang="en-US" smtClean="0"/>
-              <a:t>1/23/2019</a:t>
+              <a:t>3/13/2019</a:t>
             </a:fld>
             <a:endParaRPr lang="en-US"/>
           </a:p>
@@ -4322,7 +4322,7 @@
           <a:p>
             <a:fld id="{C272A757-42F3-4527-9C1E-C8A1E1019F33}" type="datetimeFigureOut">
               <a:rPr lang="en-US" smtClean="0"/>
-              <a:t>1/23/2019</a:t>
+              <a:t>3/13/2019</a:t>
             </a:fld>
             <a:endParaRPr lang="en-US"/>
           </a:p>
@@ -4689,7 +4689,7 @@
           <a:p>
             <a:fld id="{C272A757-42F3-4527-9C1E-C8A1E1019F33}" type="datetimeFigureOut">
               <a:rPr lang="en-US" smtClean="0"/>
-              <a:t>1/23/2019</a:t>
+              <a:t>3/13/2019</a:t>
             </a:fld>
             <a:endParaRPr lang="en-US"/>
           </a:p>
@@ -4807,7 +4807,7 @@
           <a:p>
             <a:fld id="{C272A757-42F3-4527-9C1E-C8A1E1019F33}" type="datetimeFigureOut">
               <a:rPr lang="en-US" smtClean="0"/>
-              <a:t>1/23/2019</a:t>
+              <a:t>3/13/2019</a:t>
             </a:fld>
             <a:endParaRPr lang="en-US"/>
           </a:p>
@@ -4902,7 +4902,7 @@
           <a:p>
             <a:fld id="{C272A757-42F3-4527-9C1E-C8A1E1019F33}" type="datetimeFigureOut">
               <a:rPr lang="en-US" smtClean="0"/>
-              <a:t>1/23/2019</a:t>
+              <a:t>3/13/2019</a:t>
             </a:fld>
             <a:endParaRPr lang="en-US"/>
           </a:p>
@@ -5179,7 +5179,7 @@
           <a:p>
             <a:fld id="{C272A757-42F3-4527-9C1E-C8A1E1019F33}" type="datetimeFigureOut">
               <a:rPr lang="en-US" smtClean="0"/>
-              <a:t>1/23/2019</a:t>
+              <a:t>3/13/2019</a:t>
             </a:fld>
             <a:endParaRPr lang="en-US"/>
           </a:p>
@@ -5432,7 +5432,7 @@
           <a:p>
             <a:fld id="{C272A757-42F3-4527-9C1E-C8A1E1019F33}" type="datetimeFigureOut">
               <a:rPr lang="en-US" smtClean="0"/>
-              <a:t>1/23/2019</a:t>
+              <a:t>3/13/2019</a:t>
             </a:fld>
             <a:endParaRPr lang="en-US"/>
           </a:p>
@@ -5645,7 +5645,7 @@
           <a:p>
             <a:fld id="{C272A757-42F3-4527-9C1E-C8A1E1019F33}" type="datetimeFigureOut">
               <a:rPr lang="en-US" smtClean="0"/>
-              <a:t>1/23/2019</a:t>
+              <a:t>3/13/2019</a:t>
             </a:fld>
             <a:endParaRPr lang="en-US"/>
           </a:p>
@@ -6193,7 +6193,7 @@
           <a:p>
             <a:fld id="{68C2560D-EC28-3B41-86E8-18F1CE0113B4}" type="datetimeFigureOut">
               <a:rPr lang="en-US" smtClean="0"/>
-              <a:t>1/23/2019</a:t>
+              <a:t>3/13/2019</a:t>
             </a:fld>
             <a:endParaRPr lang="en-US"/>
           </a:p>
@@ -8347,16 +8347,18 @@
                   <a:schemeClr val="tx1"/>
                 </a:solidFill>
               </a:rPr>
-              <a:t>Research &amp; Data Services West</a:t>
-            </a:r>
-            <a:endParaRPr lang="en-US" sz="2800" b="1" dirty="0">
-              <a:solidFill>
-                <a:schemeClr val="tx1"/>
-              </a:solidFill>
-            </a:endParaRPr>
-          </a:p>
-          <a:p>
-            <a:pPr algn="l"/>
+              <a:t>Research &amp; Data </a:t>
+            </a:r>
+            <a:r>
+              <a:rPr lang="en-US" sz="2800" b="1" dirty="0" smtClean="0">
+                <a:solidFill>
+                  <a:schemeClr val="tx1"/>
+                </a:solidFill>
+              </a:rPr>
+              <a:t>Services</a:t>
+            </a:r>
+          </a:p>
+          <a:p>
             <a:endParaRPr lang="en-US" sz="2800" b="1" dirty="0" smtClean="0">
               <a:solidFill>
                 <a:schemeClr val="tx1"/>
@@ -8470,15 +8472,7 @@
                   <a:schemeClr val="tx1"/>
                 </a:solidFill>
               </a:rPr>
-              <a:t>Visit</a:t>
-            </a:r>
-            <a:r>
-              <a:rPr lang="en-US" sz="2600" b="1" dirty="0" smtClean="0">
-                <a:solidFill>
-                  <a:schemeClr val="tx1"/>
-                </a:solidFill>
-              </a:rPr>
-              <a:t>: </a:t>
+              <a:t>Visit: </a:t>
             </a:r>
             <a:r>
               <a:rPr lang="en-US" sz="2600" dirty="0" smtClean="0">
@@ -9124,7 +9118,6 @@
               <a:rPr lang="en-US" dirty="0" smtClean="0"/>
               <a:t>Basic data analyses</a:t>
             </a:r>
-            <a:endParaRPr lang="en-US" dirty="0" smtClean="0"/>
           </a:p>
           <a:p>
             <a:pPr marL="0" indent="0">

</xml_diff>